<commit_message>
kickoff: WP3 slides update
</commit_message>
<xml_diff>
--- a/kickoff/wp3-eu-summary.pptx
+++ b/kickoff/wp3-eu-summary.pptx
@@ -5,17 +5,16 @@
     <p:sldMasterId id="2147483648" r:id="rId1"/>
   </p:sldMasterIdLst>
   <p:notesMasterIdLst>
-    <p:notesMasterId r:id="rId7"/>
+    <p:notesMasterId r:id="rId6"/>
   </p:notesMasterIdLst>
   <p:handoutMasterIdLst>
-    <p:handoutMasterId r:id="rId8"/>
+    <p:handoutMasterId r:id="rId7"/>
   </p:handoutMasterIdLst>
   <p:sldIdLst>
-    <p:sldId id="268" r:id="rId2"/>
-    <p:sldId id="269" r:id="rId3"/>
-    <p:sldId id="270" r:id="rId4"/>
-    <p:sldId id="274" r:id="rId5"/>
-    <p:sldId id="284" r:id="rId6"/>
+    <p:sldId id="285" r:id="rId2"/>
+    <p:sldId id="270" r:id="rId3"/>
+    <p:sldId id="274" r:id="rId4"/>
+    <p:sldId id="284" r:id="rId5"/>
   </p:sldIdLst>
   <p:sldSz cx="13004800" cy="9753600"/>
   <p:notesSz cx="6858000" cy="9144000"/>
@@ -5298,12 +5297,12 @@
       </p:grpSpPr>
       <p:sp>
         <p:nvSpPr>
-          <p:cNvPr id="7" name="Titel 6"/>
+          <p:cNvPr id="2" name="Title 1"/>
           <p:cNvSpPr>
             <a:spLocks noGrp="1"/>
           </p:cNvSpPr>
           <p:nvPr>
-            <p:ph type="title"/>
+            <p:ph type="ctrTitle"/>
           </p:nvPr>
         </p:nvSpPr>
         <p:spPr/>
@@ -5312,172 +5311,64 @@
           <a:lstStyle/>
           <a:p>
             <a:r>
-              <a:rPr lang="en-US" sz="4000" dirty="0" smtClean="0"/>
-              <a:t>WP3 Objectives</a:t>
-            </a:r>
-            <a:endParaRPr lang="en-US" sz="4000" dirty="0"/>
+              <a:rPr lang="en-GB" dirty="0" err="1" smtClean="0"/>
+              <a:t>Middlebox</a:t>
+            </a:r>
+            <a:r>
+              <a:rPr lang="en-GB" dirty="0" smtClean="0"/>
+              <a:t> Cooperation</a:t>
+            </a:r>
+            <a:endParaRPr lang="en-US" dirty="0"/>
           </a:p>
         </p:txBody>
       </p:sp>
       <p:sp>
         <p:nvSpPr>
-          <p:cNvPr id="8" name="Textplatzhalter 7"/>
+          <p:cNvPr id="3" name="Subtitle 2"/>
           <p:cNvSpPr>
             <a:spLocks noGrp="1"/>
           </p:cNvSpPr>
           <p:nvPr>
-            <p:ph type="body" sz="quarter" idx="13"/>
+            <p:ph type="subTitle" idx="1"/>
           </p:nvPr>
         </p:nvSpPr>
         <p:spPr/>
         <p:txBody>
           <a:bodyPr>
-            <a:normAutofit fontScale="92500" lnSpcReduction="20000"/>
+            <a:noAutofit/>
           </a:bodyPr>
           <a:lstStyle/>
           <a:p>
             <a:r>
-              <a:rPr lang="en-GB" sz="3300" b="1" dirty="0" smtClean="0"/>
-              <a:t>Definition </a:t>
-            </a:r>
-            <a:r>
-              <a:rPr lang="en-GB" sz="3300" b="1" dirty="0"/>
-              <a:t>of use cases and requirements for an architecture for middlebox </a:t>
-            </a:r>
-            <a:r>
-              <a:rPr lang="en-GB" sz="3300" b="1" dirty="0" smtClean="0"/>
-              <a:t>cooperation</a:t>
-            </a:r>
-          </a:p>
-          <a:p>
-            <a:pPr lvl="1"/>
-            <a:r>
-              <a:rPr lang="en-GB" sz="3100" b="1" dirty="0" smtClean="0"/>
-              <a:t>analysing deployment restrictions</a:t>
-            </a:r>
-          </a:p>
-          <a:p>
-            <a:pPr lvl="1"/>
-            <a:r>
-              <a:rPr lang="en-GB" sz="3100" b="1" dirty="0" smtClean="0"/>
-              <a:t>incentives </a:t>
-            </a:r>
-            <a:r>
-              <a:rPr lang="en-GB" sz="3100" b="1" dirty="0"/>
-              <a:t>for a middlebox cooperation protocol</a:t>
-            </a:r>
-          </a:p>
-          <a:p>
-            <a:r>
-              <a:rPr lang="en-GB" sz="3300" dirty="0" smtClean="0"/>
-              <a:t>Design</a:t>
-            </a:r>
-            <a:r>
-              <a:rPr lang="en-GB" sz="3300" dirty="0"/>
-              <a:t>, implementation, and initial testing of the Middlebox Cooperation Protocol (MCP) to provide an </a:t>
-            </a:r>
-            <a:r>
-              <a:rPr lang="en-GB" sz="3300" dirty="0" smtClean="0"/>
-              <a:t>information exchange </a:t>
-            </a:r>
-            <a:r>
-              <a:rPr lang="en-GB" sz="3300" dirty="0"/>
-              <a:t>between end hosts and </a:t>
-            </a:r>
-            <a:r>
-              <a:rPr lang="en-GB" sz="3300" dirty="0" smtClean="0"/>
-              <a:t>middleboxes</a:t>
-            </a:r>
-          </a:p>
-          <a:p>
-            <a:r>
-              <a:rPr lang="en-GB" sz="3300" dirty="0" smtClean="0"/>
-              <a:t>Design </a:t>
-            </a:r>
-            <a:r>
-              <a:rPr lang="en-GB" sz="3300" dirty="0"/>
-              <a:t>of a flexible transport stack to complement the </a:t>
-            </a:r>
-            <a:r>
-              <a:rPr lang="en-GB" sz="3300" dirty="0" smtClean="0"/>
-              <a:t>MCP</a:t>
-            </a:r>
-          </a:p>
-          <a:p>
-            <a:r>
-              <a:rPr lang="en-GB" sz="3300" b="1" dirty="0" smtClean="0"/>
-              <a:t>Threat and trust analysis of the developed protocols, protocol extensions and transport layer mechanisms as a basis for Internet-scale deployment</a:t>
-            </a:r>
-          </a:p>
-          <a:p>
-            <a:endParaRPr lang="en-US" dirty="0"/>
-          </a:p>
-        </p:txBody>
-      </p:sp>
-      <p:sp>
-        <p:nvSpPr>
-          <p:cNvPr id="4" name="Datumsplatzhalter 3"/>
-          <p:cNvSpPr>
-            <a:spLocks noGrp="1"/>
-          </p:cNvSpPr>
-          <p:nvPr>
-            <p:ph type="dt" sz="half" idx="14"/>
-          </p:nvPr>
-        </p:nvSpPr>
-        <p:spPr/>
-        <p:txBody>
-          <a:bodyPr/>
-          <a:lstStyle/>
-          <a:p>
-            <a:fld id="{56C178FB-AD3C-441F-9942-D5F1D5B7084F}" type="datetime1">
-              <a:rPr lang="en-US" smtClean="0"/>
-              <a:t>3/1/2016</a:t>
-            </a:fld>
-            <a:endParaRPr lang="en-US" dirty="0"/>
-          </a:p>
-        </p:txBody>
-      </p:sp>
-      <p:sp>
-        <p:nvSpPr>
-          <p:cNvPr id="5" name="Foliennummernplatzhalter 4"/>
-          <p:cNvSpPr>
-            <a:spLocks noGrp="1"/>
-          </p:cNvSpPr>
-          <p:nvPr>
-            <p:ph type="sldNum" sz="quarter" idx="16"/>
-          </p:nvPr>
-        </p:nvSpPr>
-        <p:spPr/>
-        <p:txBody>
-          <a:bodyPr/>
-          <a:lstStyle/>
-          <a:p>
-            <a:fld id="{CA36C8A0-BAEB-42C3-A2D9-B1F0D6FD294D}" type="slidenum">
-              <a:rPr lang="de-CH" smtClean="0"/>
-              <a:pPr/>
-              <a:t>1</a:t>
-            </a:fld>
-            <a:endParaRPr lang="de-CH" dirty="0" smtClean="0"/>
-          </a:p>
-        </p:txBody>
-      </p:sp>
-      <p:sp>
-        <p:nvSpPr>
-          <p:cNvPr id="9" name="Textplatzhalter 8"/>
-          <p:cNvSpPr>
-            <a:spLocks noGrp="1"/>
-          </p:cNvSpPr>
-          <p:nvPr>
-            <p:ph type="body" sz="quarter" idx="17"/>
-          </p:nvPr>
-        </p:nvSpPr>
-        <p:spPr/>
-        <p:txBody>
-          <a:bodyPr>
-            <a:normAutofit lnSpcReduction="10000"/>
-          </a:bodyPr>
-          <a:lstStyle/>
-          <a:p>
+              <a:rPr lang="en-GB" dirty="0" err="1" smtClean="0"/>
+              <a:t>Gorry</a:t>
+            </a:r>
+            <a:r>
+              <a:rPr lang="en-GB" dirty="0" smtClean="0"/>
+              <a:t> </a:t>
+            </a:r>
+            <a:r>
+              <a:rPr lang="en-GB" dirty="0" err="1" smtClean="0"/>
+              <a:t>Fairhurst</a:t>
+            </a:r>
+            <a:r>
+              <a:rPr lang="en-GB" dirty="0" smtClean="0"/>
+              <a:t> &amp; Iain Learmonth, University of Aberdeen, WP3 Lead</a:t>
+            </a:r>
+          </a:p>
+          <a:p>
+            <a:r>
+              <a:rPr lang="en-GB" dirty="0" smtClean="0"/>
+              <a:t>3</a:t>
+            </a:r>
+            <a:r>
+              <a:rPr lang="en-GB" baseline="30000" dirty="0" smtClean="0"/>
+              <a:t>rd</a:t>
+            </a:r>
+            <a:r>
+              <a:rPr lang="en-GB" dirty="0" smtClean="0"/>
+              <a:t> March 2016</a:t>
+            </a:r>
             <a:endParaRPr lang="en-US" dirty="0"/>
           </a:p>
         </p:txBody>
@@ -5485,7 +5376,7 @@
     </p:spTree>
     <p:extLst>
       <p:ext uri="{BB962C8B-B14F-4D97-AF65-F5344CB8AC3E}">
-        <p14:creationId xmlns:p14="http://schemas.microsoft.com/office/powerpoint/2010/main" val="1524336805"/>
+        <p14:creationId xmlns:p14="http://schemas.microsoft.com/office/powerpoint/2010/main" val="3937378751"/>
       </p:ext>
     </p:extLst>
   </p:cSld>
@@ -5493,13 +5384,6 @@
     <a:masterClrMapping/>
   </p:clrMapOvr>
   <p:transition spd="med"/>
-  <p:timing>
-    <p:tnLst>
-      <p:par>
-        <p:cTn id="1" dur="indefinite" restart="never" nodeType="tmRoot"/>
-      </p:par>
-    </p:tnLst>
-  </p:timing>
 </p:sld>
 </file>
 
@@ -5537,9 +5421,34 @@
           <a:p>
             <a:r>
               <a:rPr lang="en-GB" sz="4000" dirty="0" smtClean="0"/>
-              <a:t>WP3 Tasks Overview</a:t>
-            </a:r>
-            <a:endParaRPr lang="en-GB" sz="4000" dirty="0"/>
+              <a:t>T3.1: </a:t>
+            </a:r>
+            <a:r>
+              <a:rPr lang="en-GB" sz="4000" dirty="0"/>
+              <a:t>Use Case Analysis and Requirement Definition (M1 - M6</a:t>
+            </a:r>
+            <a:r>
+              <a:rPr lang="en-GB" sz="4000" dirty="0" smtClean="0"/>
+              <a:t>)</a:t>
+            </a:r>
+            <a:br>
+              <a:rPr lang="en-GB" sz="4000" dirty="0" smtClean="0"/>
+            </a:br>
+            <a:r>
+              <a:rPr lang="en-GB" sz="2800" b="0" i="1" dirty="0"/>
+              <a:t>Participants: ETH, TID, ZHAW, ALU</a:t>
+            </a:r>
+            <a:br>
+              <a:rPr lang="en-GB" sz="2800" b="0" i="1" dirty="0"/>
+            </a:br>
+            <a:r>
+              <a:rPr lang="en-GB" sz="4000" dirty="0"/>
+              <a:t/>
+            </a:r>
+            <a:br>
+              <a:rPr lang="en-GB" sz="4000" dirty="0"/>
+            </a:br>
+            <a:endParaRPr lang="en-GB" dirty="0"/>
           </a:p>
         </p:txBody>
       </p:sp>
@@ -5555,90 +5464,135 @@
         </p:nvSpPr>
         <p:spPr/>
         <p:txBody>
-          <a:bodyPr/>
+          <a:bodyPr>
+            <a:normAutofit fontScale="92500"/>
+          </a:bodyPr>
           <a:lstStyle/>
           <a:p>
             <a:r>
-              <a:rPr lang="en-GB" sz="2400" b="1" dirty="0" smtClean="0"/>
-              <a:t>T3.1</a:t>
-            </a:r>
-            <a:r>
-              <a:rPr lang="en-GB" sz="2400" b="1" dirty="0"/>
-              <a:t>: Use Case Analysis and Requirement </a:t>
-            </a:r>
-            <a:r>
-              <a:rPr lang="en-GB" sz="2400" b="1" dirty="0" smtClean="0"/>
-              <a:t>Definition (M1 - M6)</a:t>
-            </a:r>
-          </a:p>
-          <a:p>
-            <a:r>
-              <a:rPr lang="en-GB" sz="2400" dirty="0" smtClean="0"/>
-              <a:t>T3.2</a:t>
-            </a:r>
-            <a:r>
-              <a:rPr lang="en-GB" sz="2400" dirty="0"/>
-              <a:t>: Design of the </a:t>
-            </a:r>
-            <a:r>
-              <a:rPr lang="en-GB" sz="2400" dirty="0" smtClean="0"/>
-              <a:t>MCP (M7 - M24)</a:t>
-            </a:r>
-          </a:p>
-          <a:p>
-            <a:r>
-              <a:rPr lang="en-GB" sz="2400" dirty="0" smtClean="0"/>
-              <a:t>T3.3</a:t>
-            </a:r>
-            <a:r>
-              <a:rPr lang="en-GB" sz="2400" dirty="0"/>
-              <a:t>: Design of a flexible cooperative transport </a:t>
-            </a:r>
-            <a:r>
-              <a:rPr lang="en-GB" sz="2400" dirty="0" smtClean="0"/>
-              <a:t>layer (M7 - M30)</a:t>
-            </a:r>
-          </a:p>
-          <a:p>
-            <a:r>
-              <a:rPr lang="en-GB" sz="2400" dirty="0" smtClean="0"/>
-              <a:t>T3.4</a:t>
-            </a:r>
-            <a:r>
-              <a:rPr lang="en-GB" sz="2400" dirty="0"/>
-              <a:t>: Implementation and </a:t>
-            </a:r>
-            <a:r>
-              <a:rPr lang="en-GB" sz="2400" dirty="0" smtClean="0"/>
-              <a:t>Testing (M9 - M30)</a:t>
-            </a:r>
-          </a:p>
-          <a:p>
-            <a:r>
-              <a:rPr lang="en-GB" sz="2400" b="1" dirty="0" smtClean="0"/>
-              <a:t>T3.5</a:t>
-            </a:r>
-            <a:r>
-              <a:rPr lang="en-GB" sz="2400" b="1" dirty="0"/>
-              <a:t>: Threat and Trust Analysis for Middlebox </a:t>
-            </a:r>
-            <a:r>
-              <a:rPr lang="en-GB" sz="2400" b="1" dirty="0" smtClean="0"/>
-              <a:t>Cooperation (M1 - M30)</a:t>
-            </a:r>
-            <a:endParaRPr lang="en-GB" sz="2400" b="1" dirty="0"/>
-          </a:p>
-          <a:p>
-            <a:endParaRPr lang="en-GB" dirty="0"/>
-          </a:p>
-          <a:p>
-            <a:endParaRPr lang="en-GB" dirty="0"/>
-          </a:p>
-          <a:p>
-            <a:endParaRPr lang="en-GB" dirty="0"/>
-          </a:p>
-          <a:p>
-            <a:endParaRPr lang="en-GB" dirty="0"/>
+              <a:rPr lang="en-GB" sz="3200" dirty="0" smtClean="0"/>
+              <a:t>Performing a </a:t>
+            </a:r>
+            <a:r>
+              <a:rPr lang="en-GB" sz="3200" dirty="0"/>
+              <a:t>detailed analysis of a set of use cases for </a:t>
+            </a:r>
+            <a:r>
+              <a:rPr lang="en-GB" sz="3200" dirty="0" smtClean="0"/>
+              <a:t>MCP</a:t>
+            </a:r>
+          </a:p>
+          <a:p>
+            <a:r>
+              <a:rPr lang="en-GB" sz="3200" dirty="0" smtClean="0"/>
+              <a:t>Developing the use cases:</a:t>
+            </a:r>
+            <a:endParaRPr lang="en-GB" sz="3200" dirty="0" smtClean="0"/>
+          </a:p>
+          <a:p>
+            <a:pPr lvl="1"/>
+            <a:r>
+              <a:rPr lang="en-GB" sz="3000" dirty="0" smtClean="0"/>
+              <a:t>Low-Latency</a:t>
+            </a:r>
+          </a:p>
+          <a:p>
+            <a:pPr lvl="1"/>
+            <a:r>
+              <a:rPr lang="en-GB" sz="3000" dirty="0" smtClean="0"/>
+              <a:t>Privacy Protection Gateway</a:t>
+            </a:r>
+          </a:p>
+          <a:p>
+            <a:pPr lvl="1"/>
+            <a:r>
+              <a:rPr lang="en-GB" sz="3000" dirty="0" smtClean="0"/>
+              <a:t>Multipath TCP Proxy (may not be implemented)</a:t>
+            </a:r>
+            <a:endParaRPr lang="en-GB" sz="3000" dirty="0" smtClean="0"/>
+          </a:p>
+          <a:p>
+            <a:r>
+              <a:rPr lang="en-GB" sz="3200" dirty="0" smtClean="0"/>
+              <a:t>Contributing </a:t>
+            </a:r>
+            <a:r>
+              <a:rPr lang="en-GB" sz="3200" dirty="0" smtClean="0"/>
+              <a:t>to standards:</a:t>
+            </a:r>
+            <a:endParaRPr lang="en-GB" sz="3200" dirty="0"/>
+          </a:p>
+          <a:p>
+            <a:pPr lvl="1"/>
+            <a:r>
+              <a:rPr lang="en-GB" sz="1800" dirty="0" smtClean="0">
+                <a:hlinkClick r:id="rId2"/>
+              </a:rPr>
+              <a:t>https://tools.ietf.org/html/draft-kuehlewind-spud-use-cases-00</a:t>
+            </a:r>
+            <a:r>
+              <a:rPr lang="en-GB" sz="1800" dirty="0" smtClean="0"/>
+              <a:t> </a:t>
+            </a:r>
+          </a:p>
+          <a:p>
+            <a:pPr lvl="1"/>
+            <a:r>
+              <a:rPr lang="en-GB" sz="1800" dirty="0">
+                <a:hlinkClick r:id="rId3"/>
+              </a:rPr>
+              <a:t>https://tools.ietf.org/html/draft-trammell-spud-req-01</a:t>
+            </a:r>
+            <a:r>
+              <a:rPr lang="en-GB" sz="1800" dirty="0"/>
+              <a:t> </a:t>
+            </a:r>
+            <a:endParaRPr lang="en-GB" sz="1800" dirty="0" smtClean="0"/>
+          </a:p>
+          <a:p>
+            <a:pPr lvl="1"/>
+            <a:r>
+              <a:rPr lang="en-GB" sz="1800" dirty="0">
+                <a:hlinkClick r:id="rId4"/>
+              </a:rPr>
+              <a:t>https://</a:t>
+            </a:r>
+            <a:r>
+              <a:rPr lang="en-GB" sz="1800" dirty="0" smtClean="0">
+                <a:hlinkClick r:id="rId4"/>
+              </a:rPr>
+              <a:t>tools.ietf.org/html/draft-trammell-stackevo-explicit-coop-00</a:t>
+            </a:r>
+            <a:r>
+              <a:rPr lang="en-GB" sz="1800" dirty="0" smtClean="0"/>
+              <a:t> </a:t>
+            </a:r>
+          </a:p>
+          <a:p>
+            <a:r>
+              <a:rPr lang="en-GB" dirty="0" smtClean="0"/>
+              <a:t>The use cases and requirements documents are to be updated </a:t>
+            </a:r>
+            <a:r>
+              <a:rPr lang="en-GB" dirty="0"/>
+              <a:t>in the next weeks (before the IETF </a:t>
+            </a:r>
+            <a:r>
+              <a:rPr lang="en-GB" dirty="0" smtClean="0"/>
+              <a:t>cut-off </a:t>
+            </a:r>
+            <a:r>
+              <a:rPr lang="en-GB" dirty="0"/>
+              <a:t>on Mar </a:t>
+            </a:r>
+            <a:r>
+              <a:rPr lang="en-GB" dirty="0" smtClean="0"/>
+              <a:t>28)</a:t>
+            </a:r>
+            <a:endParaRPr lang="en-GB" dirty="0" smtClean="0"/>
+          </a:p>
+          <a:p>
+            <a:endParaRPr lang="en-GB" dirty="0" smtClean="0"/>
           </a:p>
         </p:txBody>
       </p:sp>
@@ -5657,9 +5611,9 @@
           <a:bodyPr/>
           <a:lstStyle/>
           <a:p>
-            <a:fld id="{C892429F-A889-4137-B515-7EA37AEB6174}" type="datetime1">
+            <a:fld id="{8A88F3E1-7390-42E5-AEEB-C4CB490EAC39}" type="datetime1">
               <a:rPr lang="en-US" smtClean="0"/>
-              <a:t>3/1/2016</a:t>
+              <a:t>3/2/2016</a:t>
             </a:fld>
             <a:endParaRPr lang="en-US" dirty="0"/>
           </a:p>
@@ -5710,34 +5664,10 @@
           </a:p>
         </p:txBody>
       </p:sp>
-      <p:pic>
-        <p:nvPicPr>
-          <p:cNvPr id="8" name="Picture 7"/>
-          <p:cNvPicPr>
-            <a:picLocks noChangeAspect="1"/>
-          </p:cNvPicPr>
-          <p:nvPr/>
-        </p:nvPicPr>
-        <p:blipFill>
-          <a:blip r:embed="rId2"/>
-          <a:stretch>
-            <a:fillRect/>
-          </a:stretch>
-        </p:blipFill>
-        <p:spPr>
-          <a:xfrm>
-            <a:off x="752390" y="5884913"/>
-            <a:ext cx="11469274" cy="2035670"/>
-          </a:xfrm>
-          <a:prstGeom prst="rect">
-            <a:avLst/>
-          </a:prstGeom>
-        </p:spPr>
-      </p:pic>
     </p:spTree>
     <p:extLst>
       <p:ext uri="{BB962C8B-B14F-4D97-AF65-F5344CB8AC3E}">
-        <p14:creationId xmlns:p14="http://schemas.microsoft.com/office/powerpoint/2010/main" val="3281852348"/>
+        <p14:creationId xmlns:p14="http://schemas.microsoft.com/office/powerpoint/2010/main" val="838531770"/>
       </p:ext>
     </p:extLst>
   </p:cSld>
@@ -5788,26 +5718,22 @@
           <a:lstStyle/>
           <a:p>
             <a:r>
-              <a:rPr lang="en-GB" sz="4000" dirty="0" smtClean="0"/>
-              <a:t>T3.1: </a:t>
-            </a:r>
-            <a:r>
               <a:rPr lang="en-GB" sz="4000" dirty="0"/>
-              <a:t>Use Case Analysis and Requirement Definition (M1 - M6</a:t>
-            </a:r>
-            <a:r>
-              <a:rPr lang="en-GB" sz="4000" dirty="0" smtClean="0"/>
-              <a:t>)</a:t>
+              <a:t>T3.5: Threat and Trust Analysis for Middlebox Cooperation (M1 - M30)</a:t>
             </a:r>
             <a:br>
-              <a:rPr lang="en-GB" sz="4000" dirty="0" smtClean="0"/>
+              <a:rPr lang="en-GB" sz="4000" dirty="0"/>
             </a:br>
             <a:r>
               <a:rPr lang="en-GB" sz="2800" b="0" i="1" dirty="0"/>
-              <a:t>Participants: ETH, TID, ZHAW, ALU</a:t>
+              <a:t>Participants: TID, ALU, ZHAW</a:t>
+            </a:r>
+            <a:r>
+              <a:rPr lang="en-GB" sz="3200" b="0" i="1" dirty="0"/>
+              <a:t/>
             </a:r>
             <a:br>
-              <a:rPr lang="en-GB" sz="2800" b="0" i="1" dirty="0"/>
+              <a:rPr lang="en-GB" sz="3200" b="0" i="1" dirty="0"/>
             </a:br>
             <a:r>
               <a:rPr lang="en-GB" sz="4000" dirty="0"/>
@@ -5838,111 +5764,149 @@
           <a:lstStyle/>
           <a:p>
             <a:r>
-              <a:rPr lang="en-GB" sz="3200" dirty="0" smtClean="0"/>
-              <a:t>Performing a </a:t>
-            </a:r>
-            <a:r>
-              <a:rPr lang="en-GB" sz="3200" dirty="0"/>
-              <a:t>detailed analysis of a set of use cases for </a:t>
-            </a:r>
-            <a:r>
-              <a:rPr lang="en-GB" sz="3200" dirty="0" smtClean="0"/>
-              <a:t>MCP</a:t>
-            </a:r>
-          </a:p>
-          <a:p>
-            <a:r>
-              <a:rPr lang="en-GB" sz="3200" dirty="0" smtClean="0"/>
-              <a:t>Building on the use cases specified in the </a:t>
-            </a:r>
-            <a:r>
-              <a:rPr lang="en-GB" sz="3200" dirty="0" err="1" smtClean="0"/>
-              <a:t>DoW</a:t>
-            </a:r>
-            <a:r>
-              <a:rPr lang="en-GB" sz="3200" dirty="0" smtClean="0"/>
-              <a:t>, e.g.:</a:t>
+              <a:rPr lang="en-GB" dirty="0" smtClean="0">
+                <a:solidFill>
+                  <a:schemeClr val="tx1"/>
+                </a:solidFill>
+              </a:rPr>
+              <a:t>Developing a </a:t>
+            </a:r>
+            <a:r>
+              <a:rPr lang="en-GB" dirty="0">
+                <a:solidFill>
+                  <a:schemeClr val="tx1"/>
+                </a:solidFill>
+              </a:rPr>
+              <a:t>threat model to investigate </a:t>
+            </a:r>
+            <a:r>
+              <a:rPr lang="en-GB" dirty="0" smtClean="0">
+                <a:solidFill>
+                  <a:schemeClr val="tx1"/>
+                </a:solidFill>
+              </a:rPr>
+              <a:t>confidentiality, integrity, authentication and trust issues</a:t>
+            </a:r>
+          </a:p>
+          <a:p>
+            <a:r>
+              <a:rPr lang="en-GB" dirty="0" smtClean="0">
+                <a:solidFill>
+                  <a:schemeClr val="tx1"/>
+                </a:solidFill>
+              </a:rPr>
+              <a:t>Exploring security mechanisms and their applicability:</a:t>
             </a:r>
           </a:p>
           <a:p>
             <a:pPr lvl="1"/>
             <a:r>
-              <a:rPr lang="en-GB" sz="3000" dirty="0" smtClean="0"/>
-              <a:t>Low-Latency</a:t>
+              <a:rPr lang="en-GB" sz="2600" dirty="0" smtClean="0">
+                <a:solidFill>
+                  <a:schemeClr val="tx1"/>
+                </a:solidFill>
+              </a:rPr>
+              <a:t>EFGH – presented at Hot </a:t>
+            </a:r>
+            <a:r>
+              <a:rPr lang="en-GB" sz="2600" dirty="0" err="1" smtClean="0">
+                <a:solidFill>
+                  <a:schemeClr val="tx1"/>
+                </a:solidFill>
+              </a:rPr>
+              <a:t>Middlebox</a:t>
+            </a:r>
+            <a:r>
+              <a:rPr lang="en-GB" sz="2600" dirty="0" smtClean="0">
+                <a:solidFill>
+                  <a:schemeClr val="tx1"/>
+                </a:solidFill>
+              </a:rPr>
+              <a:t> 2015</a:t>
             </a:r>
           </a:p>
           <a:p>
             <a:pPr lvl="1"/>
             <a:r>
-              <a:rPr lang="en-GB" sz="3000" dirty="0" smtClean="0"/>
-              <a:t>Firewall Traversal</a:t>
-            </a:r>
-          </a:p>
-          <a:p>
-            <a:pPr lvl="1"/>
-            <a:r>
-              <a:rPr lang="en-GB" sz="3000" dirty="0" smtClean="0"/>
-              <a:t>State Lifetime Discovery</a:t>
-            </a:r>
-          </a:p>
-          <a:p>
-            <a:r>
-              <a:rPr lang="en-GB" sz="3200" dirty="0" smtClean="0"/>
-              <a:t>Contributing to standards:</a:t>
-            </a:r>
-            <a:endParaRPr lang="en-GB" sz="3200" dirty="0"/>
-          </a:p>
-          <a:p>
-            <a:pPr lvl="1"/>
-            <a:r>
-              <a:rPr lang="en-GB" sz="1800" dirty="0" smtClean="0">
-                <a:hlinkClick r:id="rId2"/>
+              <a:rPr lang="en-GB" sz="2600" dirty="0" smtClean="0">
+                <a:solidFill>
+                  <a:schemeClr val="tx1"/>
+                </a:solidFill>
               </a:rPr>
-              <a:t>https://tools.ietf.org/html/draft-kuehlewind-spud-use-cases-00</a:t>
-            </a:r>
-            <a:r>
-              <a:rPr lang="en-GB" sz="1800" dirty="0" smtClean="0"/>
-              <a:t> </a:t>
-            </a:r>
-          </a:p>
-          <a:p>
-            <a:pPr lvl="1"/>
-            <a:r>
-              <a:rPr lang="en-GB" sz="1800" dirty="0">
-                <a:hlinkClick r:id="rId3"/>
+              <a:t>Multi-Context TLS (</a:t>
+            </a:r>
+            <a:r>
+              <a:rPr lang="en-GB" sz="2600" dirty="0" err="1" smtClean="0">
+                <a:solidFill>
+                  <a:schemeClr val="tx1"/>
+                </a:solidFill>
               </a:rPr>
-              <a:t>https://tools.ietf.org/html/draft-trammell-spud-req-01</a:t>
-            </a:r>
-            <a:r>
-              <a:rPr lang="en-GB" sz="1800" dirty="0"/>
-              <a:t> </a:t>
-            </a:r>
-            <a:endParaRPr lang="en-GB" sz="1800" dirty="0" smtClean="0"/>
-          </a:p>
-          <a:p>
-            <a:pPr lvl="1"/>
-            <a:r>
-              <a:rPr lang="en-GB" sz="1800" dirty="0">
-                <a:hlinkClick r:id="rId4"/>
+              <a:t>mcTLS</a:t>
+            </a:r>
+            <a:r>
+              <a:rPr lang="en-GB" sz="2600" dirty="0" smtClean="0">
+                <a:solidFill>
+                  <a:schemeClr val="tx1"/>
+                </a:solidFill>
               </a:rPr>
-              <a:t>https://</a:t>
-            </a:r>
-            <a:r>
-              <a:rPr lang="en-GB" sz="1800" dirty="0" smtClean="0">
-                <a:hlinkClick r:id="rId4"/>
+              <a:t>) – presented at </a:t>
+            </a:r>
+            <a:r>
+              <a:rPr lang="en-GB" sz="2600" dirty="0" err="1" smtClean="0">
+                <a:solidFill>
+                  <a:schemeClr val="tx1"/>
+                </a:solidFill>
               </a:rPr>
-              <a:t>tools.ietf.org/html/draft-trammell-stackevo-explicit-coop-00</a:t>
-            </a:r>
-            <a:r>
-              <a:rPr lang="en-GB" sz="1800" dirty="0" smtClean="0"/>
-              <a:t> </a:t>
-            </a:r>
-          </a:p>
-          <a:p>
-            <a:endParaRPr lang="en-GB" dirty="0" smtClean="0"/>
-          </a:p>
-          <a:p>
-            <a:endParaRPr lang="en-GB" dirty="0" smtClean="0"/>
+              <a:t>Sigcomm</a:t>
+            </a:r>
+            <a:r>
+              <a:rPr lang="en-GB" sz="2600" dirty="0" smtClean="0">
+                <a:solidFill>
+                  <a:schemeClr val="tx1"/>
+                </a:solidFill>
+              </a:rPr>
+              <a:t> 2015</a:t>
+            </a:r>
+            <a:endParaRPr lang="en-GB" sz="2600" dirty="0">
+              <a:solidFill>
+                <a:schemeClr val="tx1"/>
+              </a:solidFill>
+            </a:endParaRPr>
+          </a:p>
+          <a:p>
+            <a:r>
+              <a:rPr lang="en-GB" dirty="0" smtClean="0">
+                <a:solidFill>
+                  <a:schemeClr val="tx1"/>
+                </a:solidFill>
+              </a:rPr>
+              <a:t>Providing input to D3.1 (M6)</a:t>
+            </a:r>
+          </a:p>
+          <a:p>
+            <a:r>
+              <a:rPr lang="en-GB" dirty="0" smtClean="0">
+                <a:solidFill>
+                  <a:schemeClr val="tx1"/>
+                </a:solidFill>
+              </a:rPr>
+              <a:t>Later, producing </a:t>
+            </a:r>
+            <a:r>
+              <a:rPr lang="en-GB" dirty="0">
+                <a:solidFill>
+                  <a:schemeClr val="tx1"/>
+                </a:solidFill>
+              </a:rPr>
+              <a:t>a security analysis of MCP including an investigation of how hard it will be to subvert</a:t>
+            </a:r>
+          </a:p>
+          <a:p>
+            <a:endParaRPr lang="en-GB" dirty="0">
+              <a:solidFill>
+                <a:schemeClr val="tx1"/>
+              </a:solidFill>
+            </a:endParaRPr>
           </a:p>
         </p:txBody>
       </p:sp>
@@ -5961,7 +5925,7 @@
           <a:bodyPr/>
           <a:lstStyle/>
           <a:p>
-            <a:fld id="{8A88F3E1-7390-42E5-AEEB-C4CB490EAC39}" type="datetime1">
+            <a:fld id="{693C5C7F-7670-486F-AE59-073C6E27B461}" type="datetime1">
               <a:rPr lang="en-US" smtClean="0"/>
               <a:t>3/1/2016</a:t>
             </a:fld>
@@ -6017,7 +5981,7 @@
     </p:spTree>
     <p:extLst>
       <p:ext uri="{BB962C8B-B14F-4D97-AF65-F5344CB8AC3E}">
-        <p14:creationId xmlns:p14="http://schemas.microsoft.com/office/powerpoint/2010/main" val="838531770"/>
+        <p14:creationId xmlns:p14="http://schemas.microsoft.com/office/powerpoint/2010/main" val="2579952280"/>
       </p:ext>
     </p:extLst>
   </p:cSld>
@@ -6068,29 +6032,18 @@
           <a:lstStyle/>
           <a:p>
             <a:r>
-              <a:rPr lang="en-GB" sz="4000" dirty="0"/>
-              <a:t>T3.5: Threat and Trust Analysis for Middlebox Cooperation (M1 - M30)</a:t>
+              <a:rPr lang="en-GB" sz="4000" dirty="0" smtClean="0"/>
+              <a:t>First Deliverable – M6</a:t>
             </a:r>
             <a:br>
-              <a:rPr lang="en-GB" sz="4000" dirty="0"/>
+              <a:rPr lang="en-GB" sz="4000" dirty="0" smtClean="0"/>
             </a:br>
             <a:r>
-              <a:rPr lang="en-GB" sz="2800" b="0" i="1" dirty="0"/>
-              <a:t>Participants: TID, ALU, ZHAW</a:t>
-            </a:r>
-            <a:r>
-              <a:rPr lang="en-GB" sz="3200" b="0" i="1" dirty="0"/>
+              <a:rPr lang="en-GB" dirty="0"/>
               <a:t/>
             </a:r>
             <a:br>
-              <a:rPr lang="en-GB" sz="3200" b="0" i="1" dirty="0"/>
-            </a:br>
-            <a:r>
-              <a:rPr lang="en-GB" sz="4000" dirty="0"/>
-              <a:t/>
-            </a:r>
-            <a:br>
-              <a:rPr lang="en-GB" sz="4000" dirty="0"/>
+              <a:rPr lang="en-GB" dirty="0"/>
             </a:br>
             <a:endParaRPr lang="en-GB" dirty="0"/>
           </a:p>
@@ -6114,149 +6067,39 @@
           <a:lstStyle/>
           <a:p>
             <a:r>
-              <a:rPr lang="en-GB" dirty="0" smtClean="0">
-                <a:solidFill>
-                  <a:schemeClr val="tx1"/>
-                </a:solidFill>
-              </a:rPr>
-              <a:t>Developing a </a:t>
-            </a:r>
-            <a:r>
-              <a:rPr lang="en-GB" dirty="0">
-                <a:solidFill>
-                  <a:schemeClr val="tx1"/>
-                </a:solidFill>
-              </a:rPr>
-              <a:t>threat model to investigate </a:t>
-            </a:r>
-            <a:r>
-              <a:rPr lang="en-GB" dirty="0" smtClean="0">
-                <a:solidFill>
-                  <a:schemeClr val="tx1"/>
-                </a:solidFill>
-              </a:rPr>
-              <a:t>confidentiality, integrity, authentication and trust issues</a:t>
-            </a:r>
-          </a:p>
-          <a:p>
-            <a:r>
-              <a:rPr lang="en-GB" dirty="0" smtClean="0">
-                <a:solidFill>
-                  <a:schemeClr val="tx1"/>
-                </a:solidFill>
-              </a:rPr>
-              <a:t>Exploring security mechanisms and their applicability:</a:t>
+              <a:rPr lang="en-GB" dirty="0" smtClean="0"/>
+              <a:t>D3.1: The </a:t>
+            </a:r>
+            <a:r>
+              <a:rPr lang="en-GB" dirty="0"/>
+              <a:t>final outcome of </a:t>
+            </a:r>
+            <a:r>
+              <a:rPr lang="en-GB" dirty="0" smtClean="0"/>
+              <a:t>T3.1 and interim reporting from T3.5</a:t>
             </a:r>
           </a:p>
           <a:p>
             <a:pPr lvl="1"/>
             <a:r>
-              <a:rPr lang="en-GB" sz="2600" dirty="0" smtClean="0">
-                <a:solidFill>
-                  <a:schemeClr val="tx1"/>
-                </a:solidFill>
-              </a:rPr>
-              <a:t>EFGH – presented at Hot </a:t>
-            </a:r>
-            <a:r>
-              <a:rPr lang="en-GB" sz="2600" dirty="0" err="1" smtClean="0">
-                <a:solidFill>
-                  <a:schemeClr val="tx1"/>
-                </a:solidFill>
-              </a:rPr>
-              <a:t>Middlebox</a:t>
-            </a:r>
-            <a:r>
-              <a:rPr lang="en-GB" sz="2600" dirty="0" smtClean="0">
-                <a:solidFill>
-                  <a:schemeClr val="tx1"/>
-                </a:solidFill>
-              </a:rPr>
-              <a:t> 2015</a:t>
+              <a:rPr lang="en-GB" dirty="0" smtClean="0"/>
+              <a:t>use cases and derived requirements </a:t>
+            </a:r>
+            <a:r>
+              <a:rPr lang="en-GB" dirty="0"/>
+              <a:t>for the protocol </a:t>
+            </a:r>
+            <a:r>
+              <a:rPr lang="en-GB" dirty="0" smtClean="0"/>
+              <a:t>design of the MCP (T3.1)</a:t>
             </a:r>
           </a:p>
           <a:p>
             <a:pPr lvl="1"/>
             <a:r>
-              <a:rPr lang="en-GB" sz="2600" dirty="0" smtClean="0">
-                <a:solidFill>
-                  <a:schemeClr val="tx1"/>
-                </a:solidFill>
-              </a:rPr>
-              <a:t>Multi-Context TLS (</a:t>
-            </a:r>
-            <a:r>
-              <a:rPr lang="en-GB" sz="2600" dirty="0" err="1" smtClean="0">
-                <a:solidFill>
-                  <a:schemeClr val="tx1"/>
-                </a:solidFill>
-              </a:rPr>
-              <a:t>mcTLS</a:t>
-            </a:r>
-            <a:r>
-              <a:rPr lang="en-GB" sz="2600" dirty="0" smtClean="0">
-                <a:solidFill>
-                  <a:schemeClr val="tx1"/>
-                </a:solidFill>
-              </a:rPr>
-              <a:t>) – presented at </a:t>
-            </a:r>
-            <a:r>
-              <a:rPr lang="en-GB" sz="2600" dirty="0" err="1" smtClean="0">
-                <a:solidFill>
-                  <a:schemeClr val="tx1"/>
-                </a:solidFill>
-              </a:rPr>
-              <a:t>Sigcomm</a:t>
-            </a:r>
-            <a:r>
-              <a:rPr lang="en-GB" sz="2600" dirty="0" smtClean="0">
-                <a:solidFill>
-                  <a:schemeClr val="tx1"/>
-                </a:solidFill>
-              </a:rPr>
-              <a:t> 2015</a:t>
-            </a:r>
-            <a:endParaRPr lang="en-GB" sz="2600" dirty="0">
-              <a:solidFill>
-                <a:schemeClr val="tx1"/>
-              </a:solidFill>
-            </a:endParaRPr>
-          </a:p>
-          <a:p>
-            <a:r>
-              <a:rPr lang="en-GB" dirty="0" smtClean="0">
-                <a:solidFill>
-                  <a:schemeClr val="tx1"/>
-                </a:solidFill>
-              </a:rPr>
-              <a:t>Providing input to D3.1 (M6)</a:t>
-            </a:r>
-          </a:p>
-          <a:p>
-            <a:r>
-              <a:rPr lang="en-GB" dirty="0" smtClean="0">
-                <a:solidFill>
-                  <a:schemeClr val="tx1"/>
-                </a:solidFill>
-              </a:rPr>
-              <a:t>Later, producing </a:t>
-            </a:r>
-            <a:r>
-              <a:rPr lang="en-GB" dirty="0">
-                <a:solidFill>
-                  <a:schemeClr val="tx1"/>
-                </a:solidFill>
-              </a:rPr>
-              <a:t>a security analysis of MCP including an investigation of how hard it will be to subvert</a:t>
-            </a:r>
-          </a:p>
-          <a:p>
-            <a:endParaRPr lang="en-GB" dirty="0">
-              <a:solidFill>
-                <a:schemeClr val="tx1"/>
-              </a:solidFill>
-            </a:endParaRPr>
+              <a:rPr lang="en-GB" dirty="0" smtClean="0"/>
+              <a:t>base security requirements for designing MCP (T3.5)</a:t>
+            </a:r>
           </a:p>
         </p:txBody>
       </p:sp>
@@ -6275,7 +6118,7 @@
           <a:bodyPr/>
           <a:lstStyle/>
           <a:p>
-            <a:fld id="{693C5C7F-7670-486F-AE59-073C6E27B461}" type="datetime1">
+            <a:fld id="{9130FF74-4C34-4337-B0A9-B89359C7FF47}" type="datetime1">
               <a:rPr lang="en-US" smtClean="0"/>
               <a:t>3/1/2016</a:t>
             </a:fld>
@@ -6302,199 +6145,6 @@
               <a:rPr lang="de-CH" smtClean="0"/>
               <a:pPr/>
               <a:t>4</a:t>
-            </a:fld>
-            <a:endParaRPr lang="de-CH" dirty="0" smtClean="0"/>
-          </a:p>
-        </p:txBody>
-      </p:sp>
-      <p:sp>
-        <p:nvSpPr>
-          <p:cNvPr id="6" name="Text Placeholder 5"/>
-          <p:cNvSpPr>
-            <a:spLocks noGrp="1"/>
-          </p:cNvSpPr>
-          <p:nvPr>
-            <p:ph type="body" sz="quarter" idx="17"/>
-          </p:nvPr>
-        </p:nvSpPr>
-        <p:spPr/>
-        <p:txBody>
-          <a:bodyPr>
-            <a:normAutofit lnSpcReduction="10000"/>
-          </a:bodyPr>
-          <a:lstStyle/>
-          <a:p>
-            <a:endParaRPr lang="en-GB" dirty="0"/>
-          </a:p>
-        </p:txBody>
-      </p:sp>
-    </p:spTree>
-    <p:extLst>
-      <p:ext uri="{BB962C8B-B14F-4D97-AF65-F5344CB8AC3E}">
-        <p14:creationId xmlns:p14="http://schemas.microsoft.com/office/powerpoint/2010/main" val="2579952280"/>
-      </p:ext>
-    </p:extLst>
-  </p:cSld>
-  <p:clrMapOvr>
-    <a:masterClrMapping/>
-  </p:clrMapOvr>
-  <p:transition spd="med"/>
-  <p:timing>
-    <p:tnLst>
-      <p:par>
-        <p:cTn id="1" dur="indefinite" restart="never" nodeType="tmRoot"/>
-      </p:par>
-    </p:tnLst>
-  </p:timing>
-</p:sld>
-</file>
-
-<file path=ppt/slides/slide5.xml><?xml version="1.0" encoding="utf-8"?>
-<p:sld xmlns:a="http://schemas.openxmlformats.org/drawingml/2006/main" xmlns:r="http://schemas.openxmlformats.org/officeDocument/2006/relationships" xmlns:p="http://schemas.openxmlformats.org/presentationml/2006/main">
-  <p:cSld>
-    <p:spTree>
-      <p:nvGrpSpPr>
-        <p:cNvPr id="1" name=""/>
-        <p:cNvGrpSpPr/>
-        <p:nvPr/>
-      </p:nvGrpSpPr>
-      <p:grpSpPr>
-        <a:xfrm>
-          <a:off x="0" y="0"/>
-          <a:ext cx="0" cy="0"/>
-          <a:chOff x="0" y="0"/>
-          <a:chExt cx="0" cy="0"/>
-        </a:xfrm>
-      </p:grpSpPr>
-      <p:sp>
-        <p:nvSpPr>
-          <p:cNvPr id="2" name="Title 1"/>
-          <p:cNvSpPr>
-            <a:spLocks noGrp="1"/>
-          </p:cNvSpPr>
-          <p:nvPr>
-            <p:ph type="title"/>
-          </p:nvPr>
-        </p:nvSpPr>
-        <p:spPr/>
-        <p:txBody>
-          <a:bodyPr/>
-          <a:lstStyle/>
-          <a:p>
-            <a:r>
-              <a:rPr lang="en-GB" sz="4000" dirty="0" smtClean="0"/>
-              <a:t>First Deliverable – M6</a:t>
-            </a:r>
-            <a:br>
-              <a:rPr lang="en-GB" sz="4000" dirty="0" smtClean="0"/>
-            </a:br>
-            <a:r>
-              <a:rPr lang="en-GB" dirty="0"/>
-              <a:t/>
-            </a:r>
-            <a:br>
-              <a:rPr lang="en-GB" dirty="0"/>
-            </a:br>
-            <a:endParaRPr lang="en-GB" dirty="0"/>
-          </a:p>
-        </p:txBody>
-      </p:sp>
-      <p:sp>
-        <p:nvSpPr>
-          <p:cNvPr id="3" name="Text Placeholder 2"/>
-          <p:cNvSpPr>
-            <a:spLocks noGrp="1"/>
-          </p:cNvSpPr>
-          <p:nvPr>
-            <p:ph type="body" sz="quarter" idx="13"/>
-          </p:nvPr>
-        </p:nvSpPr>
-        <p:spPr/>
-        <p:txBody>
-          <a:bodyPr>
-            <a:normAutofit/>
-          </a:bodyPr>
-          <a:lstStyle/>
-          <a:p>
-            <a:r>
-              <a:rPr lang="en-GB" dirty="0" smtClean="0"/>
-              <a:t>D3.1: The </a:t>
-            </a:r>
-            <a:r>
-              <a:rPr lang="en-GB" dirty="0"/>
-              <a:t>final outcome of </a:t>
-            </a:r>
-            <a:r>
-              <a:rPr lang="en-GB" dirty="0" smtClean="0"/>
-              <a:t>T3.1 and interim reporting from T3.5</a:t>
-            </a:r>
-          </a:p>
-          <a:p>
-            <a:pPr lvl="1"/>
-            <a:r>
-              <a:rPr lang="en-GB" dirty="0" smtClean="0"/>
-              <a:t>use cases and derived requirements </a:t>
-            </a:r>
-            <a:r>
-              <a:rPr lang="en-GB" dirty="0"/>
-              <a:t>for the protocol </a:t>
-            </a:r>
-            <a:r>
-              <a:rPr lang="en-GB" dirty="0" smtClean="0"/>
-              <a:t>design of the MCP (T3.1)</a:t>
-            </a:r>
-          </a:p>
-          <a:p>
-            <a:pPr lvl="1"/>
-            <a:r>
-              <a:rPr lang="en-GB" dirty="0" smtClean="0"/>
-              <a:t>base security requirements for designing MCP (T3.5)</a:t>
-            </a:r>
-          </a:p>
-        </p:txBody>
-      </p:sp>
-      <p:sp>
-        <p:nvSpPr>
-          <p:cNvPr id="4" name="Date Placeholder 3"/>
-          <p:cNvSpPr>
-            <a:spLocks noGrp="1"/>
-          </p:cNvSpPr>
-          <p:nvPr>
-            <p:ph type="dt" sz="half" idx="14"/>
-          </p:nvPr>
-        </p:nvSpPr>
-        <p:spPr/>
-        <p:txBody>
-          <a:bodyPr/>
-          <a:lstStyle/>
-          <a:p>
-            <a:fld id="{9130FF74-4C34-4337-B0A9-B89359C7FF47}" type="datetime1">
-              <a:rPr lang="en-US" smtClean="0"/>
-              <a:t>3/1/2016</a:t>
-            </a:fld>
-            <a:endParaRPr lang="en-US" dirty="0"/>
-          </a:p>
-        </p:txBody>
-      </p:sp>
-      <p:sp>
-        <p:nvSpPr>
-          <p:cNvPr id="5" name="Slide Number Placeholder 4"/>
-          <p:cNvSpPr>
-            <a:spLocks noGrp="1"/>
-          </p:cNvSpPr>
-          <p:nvPr>
-            <p:ph type="sldNum" sz="quarter" idx="16"/>
-          </p:nvPr>
-        </p:nvSpPr>
-        <p:spPr/>
-        <p:txBody>
-          <a:bodyPr/>
-          <a:lstStyle/>
-          <a:p>
-            <a:fld id="{CA36C8A0-BAEB-42C3-A2D9-B1F0D6FD294D}" type="slidenum">
-              <a:rPr lang="de-CH" smtClean="0"/>
-              <a:pPr/>
-              <a:t>5</a:t>
             </a:fld>
             <a:endParaRPr lang="de-CH" dirty="0" smtClean="0"/>
           </a:p>

</xml_diff>